<commit_message>
picture shape builder in pptx tree builder
</commit_message>
<xml_diff>
--- a/luna_authoring_system/test/test_assets/2 Pictures.pptx
+++ b/luna_authoring_system/test/test_assets/2 Pictures.pptx
@@ -104,6 +104,20 @@
       </a:defRPr>
     </a:lvl9pPr>
   </p:defaultTextStyle>
+  <p:extLst>
+    <p:ext uri="{521415D9-36F7-43E2-AB2F-B90AF26B5E84}">
+      <p14:sectionLst xmlns:p14="http://schemas.microsoft.com/office/powerpoint/2010/main">
+        <p14:section name="Untitled Section" id="{C07F1526-2917-5840-9BD3-BDDDD90AF64E}">
+          <p14:sldIdLst>
+            <p14:sldId id="256"/>
+          </p14:sldIdLst>
+        </p14:section>
+      </p14:sectionLst>
+    </p:ext>
+    <p:ext uri="{EFAFB233-063F-42B5-8137-9DF3F51BA10A}">
+      <p15:sldGuideLst xmlns:p15="http://schemas.microsoft.com/office/powerpoint/2012/main"/>
+    </p:ext>
+  </p:extLst>
 </p:presentation>
 </file>
 
@@ -256,7 +270,7 @@
           <a:p>
             <a:fld id="{8C53E562-4DB1-A344-9F93-230E9C23CD48}" type="datetimeFigureOut">
               <a:rPr lang="en-KR" smtClean="0"/>
-              <a:t>6/6/25</a:t>
+              <a:t>6/7/25</a:t>
             </a:fld>
             <a:endParaRPr lang="en-KR"/>
           </a:p>
@@ -456,7 +470,7 @@
           <a:p>
             <a:fld id="{8C53E562-4DB1-A344-9F93-230E9C23CD48}" type="datetimeFigureOut">
               <a:rPr lang="en-KR" smtClean="0"/>
-              <a:t>6/6/25</a:t>
+              <a:t>6/7/25</a:t>
             </a:fld>
             <a:endParaRPr lang="en-KR"/>
           </a:p>
@@ -666,7 +680,7 @@
           <a:p>
             <a:fld id="{8C53E562-4DB1-A344-9F93-230E9C23CD48}" type="datetimeFigureOut">
               <a:rPr lang="en-KR" smtClean="0"/>
-              <a:t>6/6/25</a:t>
+              <a:t>6/7/25</a:t>
             </a:fld>
             <a:endParaRPr lang="en-KR"/>
           </a:p>
@@ -866,7 +880,7 @@
           <a:p>
             <a:fld id="{8C53E562-4DB1-A344-9F93-230E9C23CD48}" type="datetimeFigureOut">
               <a:rPr lang="en-KR" smtClean="0"/>
-              <a:t>6/6/25</a:t>
+              <a:t>6/7/25</a:t>
             </a:fld>
             <a:endParaRPr lang="en-KR"/>
           </a:p>
@@ -1142,7 +1156,7 @@
           <a:p>
             <a:fld id="{8C53E562-4DB1-A344-9F93-230E9C23CD48}" type="datetimeFigureOut">
               <a:rPr lang="en-KR" smtClean="0"/>
-              <a:t>6/6/25</a:t>
+              <a:t>6/7/25</a:t>
             </a:fld>
             <a:endParaRPr lang="en-KR"/>
           </a:p>
@@ -1410,7 +1424,7 @@
           <a:p>
             <a:fld id="{8C53E562-4DB1-A344-9F93-230E9C23CD48}" type="datetimeFigureOut">
               <a:rPr lang="en-KR" smtClean="0"/>
-              <a:t>6/6/25</a:t>
+              <a:t>6/7/25</a:t>
             </a:fld>
             <a:endParaRPr lang="en-KR"/>
           </a:p>
@@ -1825,7 +1839,7 @@
           <a:p>
             <a:fld id="{8C53E562-4DB1-A344-9F93-230E9C23CD48}" type="datetimeFigureOut">
               <a:rPr lang="en-KR" smtClean="0"/>
-              <a:t>6/6/25</a:t>
+              <a:t>6/7/25</a:t>
             </a:fld>
             <a:endParaRPr lang="en-KR"/>
           </a:p>
@@ -1967,7 +1981,7 @@
           <a:p>
             <a:fld id="{8C53E562-4DB1-A344-9F93-230E9C23CD48}" type="datetimeFigureOut">
               <a:rPr lang="en-KR" smtClean="0"/>
-              <a:t>6/6/25</a:t>
+              <a:t>6/7/25</a:t>
             </a:fld>
             <a:endParaRPr lang="en-KR"/>
           </a:p>
@@ -2080,7 +2094,7 @@
           <a:p>
             <a:fld id="{8C53E562-4DB1-A344-9F93-230E9C23CD48}" type="datetimeFigureOut">
               <a:rPr lang="en-KR" smtClean="0"/>
-              <a:t>6/6/25</a:t>
+              <a:t>6/7/25</a:t>
             </a:fld>
             <a:endParaRPr lang="en-KR"/>
           </a:p>
@@ -2393,7 +2407,7 @@
           <a:p>
             <a:fld id="{8C53E562-4DB1-A344-9F93-230E9C23CD48}" type="datetimeFigureOut">
               <a:rPr lang="en-KR" smtClean="0"/>
-              <a:t>6/6/25</a:t>
+              <a:t>6/7/25</a:t>
             </a:fld>
             <a:endParaRPr lang="en-KR"/>
           </a:p>
@@ -2682,7 +2696,7 @@
           <a:p>
             <a:fld id="{8C53E562-4DB1-A344-9F93-230E9C23CD48}" type="datetimeFigureOut">
               <a:rPr lang="en-KR" smtClean="0"/>
-              <a:t>6/6/25</a:t>
+              <a:t>6/7/25</a:t>
             </a:fld>
             <a:endParaRPr lang="en-KR"/>
           </a:p>
@@ -2925,7 +2939,7 @@
           <a:p>
             <a:fld id="{8C53E562-4DB1-A344-9F93-230E9C23CD48}" type="datetimeFigureOut">
               <a:rPr lang="en-KR" smtClean="0"/>
-              <a:t>6/6/25</a:t>
+              <a:t>6/7/25</a:t>
             </a:fld>
             <a:endParaRPr lang="en-KR"/>
           </a:p>

</xml_diff>